<commit_message>
rename script, edit welcome slide
</commit_message>
<xml_diff>
--- a/workshops/W1_intro_python/Welcome-slide.pptx
+++ b/workshops/W1_intro_python/Welcome-slide.pptx
@@ -678,13 +678,8 @@
             </a:pPr>
             <a:r>
               <a:rPr lang="en-GB" dirty="0"/>
-              <a:t>Across Biosciences, roles and with varying levels </a:t>
-            </a:r>
-            <a:r>
-              <a:rPr lang="en-GB"/>
-              <a:t>of expertise.</a:t>
-            </a:r>
-            <a:endParaRPr lang="en-GB" dirty="0"/>
+              <a:t>Across Biosciences, roles and with varying levels of expertise.</a:t>
+            </a:r>
           </a:p>
           <a:p>
             <a:pPr marL="628650" lvl="1" indent="-171450">

</xml_diff>